<commit_message>
added content to Build-On-3
</commit_message>
<xml_diff>
--- a/Resources/Build-On-3.pptx
+++ b/Resources/Build-On-3.pptx
@@ -208,7 +208,7 @@
           <a:p>
             <a:fld id="{0848BC6B-9879-4A5D-9ADD-7A7EC6F9DCFC}" type="datetimeFigureOut">
               <a:rPr lang="en-US" smtClean="0"/>
-              <a:t>3/6/2021</a:t>
+              <a:t>3/9/2021</a:t>
             </a:fld>
             <a:endParaRPr lang="en-US"/>
           </a:p>
@@ -622,7 +622,7 @@
           <a:p>
             <a:fld id="{743C5819-F2F0-4635-8846-E0D7F1235C4A}" type="datetime1">
               <a:rPr lang="en-US" smtClean="0"/>
-              <a:t>3/6/2021</a:t>
+              <a:t>3/9/2021</a:t>
             </a:fld>
             <a:endParaRPr lang="en-US"/>
           </a:p>
@@ -820,7 +820,7 @@
           <a:p>
             <a:fld id="{F9B384AA-5F95-4C33-968F-4281EE1C5D31}" type="datetime1">
               <a:rPr lang="en-US" smtClean="0"/>
-              <a:t>3/6/2021</a:t>
+              <a:t>3/9/2021</a:t>
             </a:fld>
             <a:endParaRPr lang="en-US"/>
           </a:p>
@@ -1028,7 +1028,7 @@
           <a:p>
             <a:fld id="{598AD886-C01A-47D5-80DD-8DE49FB67408}" type="datetime1">
               <a:rPr lang="en-US" smtClean="0"/>
-              <a:t>3/6/2021</a:t>
+              <a:t>3/9/2021</a:t>
             </a:fld>
             <a:endParaRPr lang="en-US"/>
           </a:p>
@@ -1226,7 +1226,7 @@
           <a:p>
             <a:fld id="{8D903533-41AC-45E1-9689-7E372F906C46}" type="datetime1">
               <a:rPr lang="en-US" smtClean="0"/>
-              <a:t>3/6/2021</a:t>
+              <a:t>3/9/2021</a:t>
             </a:fld>
             <a:endParaRPr lang="en-US"/>
           </a:p>
@@ -1506,7 +1506,7 @@
           <a:p>
             <a:fld id="{D64A9379-CA54-45F7-9973-2CA70E9FE0DA}" type="datetime1">
               <a:rPr lang="en-US" smtClean="0"/>
-              <a:t>3/6/2021</a:t>
+              <a:t>3/9/2021</a:t>
             </a:fld>
             <a:endParaRPr lang="en-US"/>
           </a:p>
@@ -1771,7 +1771,7 @@
           <a:p>
             <a:fld id="{F20E10C4-1FFF-436D-9146-BCABA5CCABDC}" type="datetime1">
               <a:rPr lang="en-US" smtClean="0"/>
-              <a:t>3/6/2021</a:t>
+              <a:t>3/9/2021</a:t>
             </a:fld>
             <a:endParaRPr lang="en-US"/>
           </a:p>
@@ -2183,7 +2183,7 @@
           <a:p>
             <a:fld id="{870AAD3C-0B7E-40D5-B7E8-235ABB682731}" type="datetime1">
               <a:rPr lang="en-US" smtClean="0"/>
-              <a:t>3/6/2021</a:t>
+              <a:t>3/9/2021</a:t>
             </a:fld>
             <a:endParaRPr lang="en-US"/>
           </a:p>
@@ -2324,7 +2324,7 @@
           <a:p>
             <a:fld id="{715EE6D3-C8C1-4419-90ED-DDD01668DDC0}" type="datetime1">
               <a:rPr lang="en-US" smtClean="0"/>
-              <a:t>3/6/2021</a:t>
+              <a:t>3/9/2021</a:t>
             </a:fld>
             <a:endParaRPr lang="en-US"/>
           </a:p>
@@ -2437,7 +2437,7 @@
           <a:p>
             <a:fld id="{38FB8FDC-B18A-4FED-99B0-72D3BD16FACD}" type="datetime1">
               <a:rPr lang="en-US" smtClean="0"/>
-              <a:t>3/6/2021</a:t>
+              <a:t>3/9/2021</a:t>
             </a:fld>
             <a:endParaRPr lang="en-US"/>
           </a:p>
@@ -2748,7 +2748,7 @@
           <a:p>
             <a:fld id="{CE06BDA3-8907-4DB2-BA4F-01F17DDA4A7B}" type="datetime1">
               <a:rPr lang="en-US" smtClean="0"/>
-              <a:t>3/6/2021</a:t>
+              <a:t>3/9/2021</a:t>
             </a:fld>
             <a:endParaRPr lang="en-US"/>
           </a:p>
@@ -3036,7 +3036,7 @@
           <a:p>
             <a:fld id="{E0CFAD89-B4BD-4F37-9D8A-960352BCDA8C}" type="datetime1">
               <a:rPr lang="en-US" smtClean="0"/>
-              <a:t>3/6/2021</a:t>
+              <a:t>3/9/2021</a:t>
             </a:fld>
             <a:endParaRPr lang="en-US"/>
           </a:p>
@@ -3277,7 +3277,7 @@
           <a:p>
             <a:fld id="{216CC113-4E9F-451A-BC11-83685A596D60}" type="datetime1">
               <a:rPr lang="en-US" smtClean="0"/>
-              <a:t>3/6/2021</a:t>
+              <a:t>3/9/2021</a:t>
             </a:fld>
             <a:endParaRPr lang="en-US"/>
           </a:p>
@@ -5297,31 +5297,63 @@
           <a:p>
             <a:pPr lvl="1"/>
             <a:r>
-              <a:rPr lang="en-US" sz="2400" dirty="0" err="1">
+              <a:rPr lang="en-US" sz="2000" dirty="0">
                 <a:hlinkClick r:id="rId7"/>
               </a:rPr>
-              <a:t>RustStory_Libraries.html#fs</a:t>
-            </a:r>
-            <a:endParaRPr lang="en-US" sz="2400" dirty="0"/>
+              <a:t>Starter Code</a:t>
+            </a:r>
+            <a:endParaRPr lang="en-US" sz="2000" dirty="0"/>
           </a:p>
           <a:p>
             <a:pPr lvl="1"/>
             <a:r>
-              <a:rPr lang="en-US" sz="2400" dirty="0" err="1">
+              <a:rPr lang="en-US" sz="2000" dirty="0">
                 <a:hlinkClick r:id="rId8"/>
               </a:rPr>
-              <a:t>std:fs</a:t>
-            </a:r>
-            <a:endParaRPr lang="en-US" sz="2400" dirty="0">
-              <a:hlinkClick r:id="rId9"/>
-            </a:endParaRPr>
-          </a:p>
-          <a:p>
-            <a:r>
-              <a:rPr lang="en-US" sz="2400" dirty="0" err="1">
+              <a:t>Error Handling Animations</a:t>
+            </a:r>
+            <a:endParaRPr lang="en-US" sz="2000" dirty="0"/>
+          </a:p>
+          <a:p>
+            <a:pPr lvl="1"/>
+            <a:r>
+              <a:rPr lang="en-US" sz="2000" dirty="0" err="1">
                 <a:hlinkClick r:id="rId9"/>
               </a:rPr>
+              <a:t>RustStory_Libraries.html#fs</a:t>
+            </a:r>
+            <a:endParaRPr lang="en-US" sz="2000" dirty="0"/>
+          </a:p>
+          <a:p>
+            <a:pPr lvl="1"/>
+            <a:r>
+              <a:rPr lang="en-US" sz="2000" dirty="0" err="1">
+                <a:hlinkClick r:id="rId10"/>
+              </a:rPr>
+              <a:t>std:fs</a:t>
+            </a:r>
+            <a:endParaRPr lang="en-US" sz="2000" dirty="0">
+              <a:hlinkClick r:id="rId11"/>
+            </a:endParaRPr>
+          </a:p>
+          <a:p>
+            <a:r>
+              <a:rPr lang="en-US" sz="2400" dirty="0" err="1">
+                <a:hlinkClick r:id="rId11"/>
+              </a:rPr>
               <a:t>BuildOn</a:t>
+            </a:r>
+            <a:r>
+              <a:rPr lang="en-US" sz="2400" dirty="0"/>
+              <a:t> – click on </a:t>
+            </a:r>
+            <a:r>
+              <a:rPr lang="en-US" sz="2400" dirty="0" err="1"/>
+              <a:t>BuildOn</a:t>
+            </a:r>
+            <a:r>
+              <a:rPr lang="en-US" sz="2400"/>
+              <a:t> code</a:t>
             </a:r>
             <a:endParaRPr lang="en-US" sz="2400" dirty="0"/>
           </a:p>
@@ -5330,7 +5362,7 @@
               <a:buNone/>
             </a:pPr>
             <a:endParaRPr lang="en-US" sz="2400" dirty="0">
-              <a:hlinkClick r:id="rId10"/>
+              <a:hlinkClick r:id="rId12"/>
             </a:endParaRPr>
           </a:p>
         </p:txBody>
@@ -5413,53 +5445,53 @@
           <a:p>
             <a:r>
               <a:rPr lang="en-US" sz="2400" dirty="0" err="1">
-                <a:hlinkClick r:id="rId11"/>
+                <a:hlinkClick r:id="rId13"/>
               </a:rPr>
               <a:t>RustBites</a:t>
-            </a:r>
-            <a:r>
-              <a:rPr lang="en-US" sz="2400" dirty="0">
-                <a:hlinkClick r:id="rId11"/>
-              </a:rPr>
-              <a:t>: Generics &amp; Traits</a:t>
-            </a:r>
-            <a:endParaRPr lang="en-US" sz="2400" dirty="0"/>
-          </a:p>
-          <a:p>
-            <a:r>
-              <a:rPr lang="en-US" sz="2400" dirty="0">
-                <a:hlinkClick r:id="rId12"/>
-              </a:rPr>
-              <a:t>Iterating over Generics</a:t>
-            </a:r>
-            <a:endParaRPr lang="en-US" sz="2400" dirty="0"/>
-          </a:p>
-          <a:p>
-            <a:r>
-              <a:rPr lang="en-US" sz="2400" dirty="0" err="1">
-                <a:hlinkClick r:id="rId13"/>
-              </a:rPr>
-              <a:t>RustStory</a:t>
             </a:r>
             <a:r>
               <a:rPr lang="en-US" sz="2400" dirty="0">
                 <a:hlinkClick r:id="rId13"/>
               </a:rPr>
-              <a:t>: Traits</a:t>
-            </a:r>
-            <a:r>
-              <a:rPr lang="en-US" sz="2400" dirty="0"/>
-              <a:t> – dynamic dispatch</a:t>
-            </a:r>
-            <a:endParaRPr lang="en-US" sz="2400" dirty="0">
-              <a:hlinkClick r:id="rId14"/>
-            </a:endParaRPr>
-          </a:p>
-          <a:p>
+              <a:t>: Generics &amp; Traits</a:t>
+            </a:r>
+            <a:endParaRPr lang="en-US" sz="2400" dirty="0"/>
+          </a:p>
+          <a:p>
+            <a:r>
+              <a:rPr lang="en-US" sz="2400" dirty="0">
+                <a:hlinkClick r:id="rId14"/>
+              </a:rPr>
+              <a:t>Iterating over Generics</a:t>
+            </a:r>
+            <a:endParaRPr lang="en-US" sz="2400" dirty="0"/>
+          </a:p>
+          <a:p>
+            <a:r>
+              <a:rPr lang="en-US" sz="2400" dirty="0" err="1">
+                <a:hlinkClick r:id="rId15"/>
+              </a:rPr>
+              <a:t>RustStory</a:t>
+            </a:r>
             <a:r>
               <a:rPr lang="en-US" sz="2400" dirty="0">
                 <a:hlinkClick r:id="rId15"/>
               </a:rPr>
+              <a:t>: Traits</a:t>
+            </a:r>
+            <a:r>
+              <a:rPr lang="en-US" sz="2400" dirty="0"/>
+              <a:t> – dynamic dispatch</a:t>
+            </a:r>
+            <a:endParaRPr lang="en-US" sz="2400" dirty="0">
+              <a:hlinkClick r:id="rId16"/>
+            </a:endParaRPr>
+          </a:p>
+          <a:p>
+            <a:r>
+              <a:rPr lang="en-US" sz="2400" dirty="0">
+                <a:hlinkClick r:id="rId17"/>
+              </a:rPr>
               <a:t>Enumerations</a:t>
             </a:r>
             <a:endParaRPr lang="en-US" sz="2400" dirty="0"/>
@@ -5468,7 +5500,7 @@
             <a:pPr lvl="1"/>
             <a:r>
               <a:rPr lang="en-US" sz="2000" dirty="0">
-                <a:hlinkClick r:id="rId16"/>
+                <a:hlinkClick r:id="rId18"/>
               </a:rPr>
               <a:t>Custom Enumerations and matching</a:t>
             </a:r>
@@ -5478,51 +5510,51 @@
             <a:pPr lvl="1"/>
             <a:r>
               <a:rPr lang="en-US" sz="2000" dirty="0">
-                <a:hlinkClick r:id="rId17"/>
+                <a:hlinkClick r:id="rId19"/>
               </a:rPr>
               <a:t>Non-Enum matching</a:t>
             </a:r>
             <a:endParaRPr lang="en-US" sz="2000" dirty="0"/>
-          </a:p>
-          <a:p>
-            <a:r>
-              <a:rPr lang="en-US" sz="2400" dirty="0" err="1">
-                <a:hlinkClick r:id="rId18"/>
-              </a:rPr>
-              <a:t>RustBites</a:t>
-            </a:r>
-            <a:r>
-              <a:rPr lang="en-US" sz="2400" dirty="0">
-                <a:hlinkClick r:id="rId18"/>
-              </a:rPr>
-              <a:t>: Options</a:t>
-            </a:r>
-            <a:endParaRPr lang="en-US" sz="2400" dirty="0"/>
-          </a:p>
-          <a:p>
-            <a:r>
-              <a:rPr lang="en-US" sz="2400" dirty="0" err="1">
-                <a:hlinkClick r:id="rId19"/>
-              </a:rPr>
-              <a:t>RustBites</a:t>
-            </a:r>
-            <a:r>
-              <a:rPr lang="en-US" sz="2400" dirty="0">
-                <a:hlinkClick r:id="rId19"/>
-              </a:rPr>
-              <a:t>: Error Handling</a:t>
-            </a:r>
-            <a:endParaRPr lang="en-US" sz="2400" dirty="0"/>
           </a:p>
           <a:p>
             <a:r>
               <a:rPr lang="en-US" sz="2400" dirty="0" err="1">
                 <a:hlinkClick r:id="rId20"/>
               </a:rPr>
+              <a:t>RustBites</a:t>
+            </a:r>
+            <a:r>
+              <a:rPr lang="en-US" sz="2400" dirty="0">
+                <a:hlinkClick r:id="rId20"/>
+              </a:rPr>
+              <a:t>: Options</a:t>
+            </a:r>
+            <a:endParaRPr lang="en-US" sz="2400" dirty="0"/>
+          </a:p>
+          <a:p>
+            <a:r>
+              <a:rPr lang="en-US" sz="2400" dirty="0" err="1">
+                <a:hlinkClick r:id="rId21"/>
+              </a:rPr>
+              <a:t>RustBites</a:t>
+            </a:r>
+            <a:r>
+              <a:rPr lang="en-US" sz="2400" dirty="0">
+                <a:hlinkClick r:id="rId21"/>
+              </a:rPr>
+              <a:t>: Error Handling</a:t>
+            </a:r>
+            <a:endParaRPr lang="en-US" sz="2400" dirty="0"/>
+          </a:p>
+          <a:p>
+            <a:r>
+              <a:rPr lang="en-US" sz="2400" dirty="0" err="1">
+                <a:hlinkClick r:id="rId8"/>
+              </a:rPr>
               <a:t>Anim_Features</a:t>
             </a:r>
             <a:endParaRPr lang="en-US" sz="2400" dirty="0">
-              <a:hlinkClick r:id="rId21" action="ppaction://hlinkfile"/>
+              <a:hlinkClick r:id="rId22" action="ppaction://hlinkfile"/>
             </a:endParaRPr>
           </a:p>
           <a:p>

</xml_diff>